<commit_message>
Updated presentations: learning python
</commit_message>
<xml_diff>
--- a/python/presentations/learning_python/11_ceda-sets__dicts.pptx
+++ b/python/presentations/learning_python/11_ceda-sets__dicts.pptx
@@ -289,7 +289,7 @@
               <a:pPr>
                 <a:defRPr/>
               </a:pPr>
-              <a:t>16/11/2021</a:t>
+              <a:t>17/11/2021</a:t>
             </a:fld>
             <a:endParaRPr lang="en-GB"/>
           </a:p>
@@ -15136,7 +15136,7 @@
               <a:pPr>
                 <a:defRPr/>
               </a:pPr>
-              <a:t>16/11/2021</a:t>
+              <a:t>17/11/2021</a:t>
             </a:fld>
             <a:endParaRPr lang="en-GB"/>
           </a:p>
@@ -15373,7 +15373,7 @@
               <a:pPr>
                 <a:defRPr/>
               </a:pPr>
-              <a:t>16/11/2021</a:t>
+              <a:t>17/11/2021</a:t>
             </a:fld>
             <a:endParaRPr lang="en-GB"/>
           </a:p>
@@ -16019,7 +16019,7 @@
               <a:pPr>
                 <a:defRPr/>
               </a:pPr>
-              <a:t>16/11/2021</a:t>
+              <a:t>17/11/2021</a:t>
             </a:fld>
             <a:endParaRPr lang="en-GB"/>
           </a:p>
@@ -33602,7 +33602,7 @@
         <p:spPr bwMode="auto">
           <a:xfrm>
             <a:off x="495360" y="345961"/>
-            <a:ext cx="8812028" cy="1204369"/>
+            <a:ext cx="7919156" cy="1175386"/>
           </a:xfrm>
           <a:prstGeom prst="rect">
             <a:avLst/>
@@ -33836,55 +33836,55 @@
               <a:defRPr/>
             </a:pPr>
             <a:r>
-              <a:rPr lang="en-US" altLang="en-US" sz="2540" dirty="0">
+              <a:rPr lang="en-US" altLang="en-US" sz="2400" dirty="0">
                 <a:latin typeface="Calibri" panose="020F0502020204030204" pitchFamily="34" charset="0"/>
               </a:rPr>
               <a:t> </a:t>
             </a:r>
             <a:r>
-              <a:rPr lang="en-US" altLang="en-US" sz="1996" dirty="0">
+              <a:rPr lang="en-US" altLang="en-US" dirty="0">
                 <a:latin typeface="Courier New" panose="02070309020205020404" pitchFamily="49" charset="0"/>
                 <a:cs typeface="Courier New" panose="02070309020205020404" pitchFamily="49" charset="0"/>
               </a:rPr>
               <a:t>.keys()</a:t>
             </a:r>
             <a:r>
-              <a:rPr lang="en-US" altLang="en-US" sz="1996" dirty="0">
+              <a:rPr lang="en-US" altLang="en-US" dirty="0">
                 <a:latin typeface="+mn-lt"/>
                 <a:cs typeface="Courier New" panose="02070309020205020404" pitchFamily="49" charset="0"/>
               </a:rPr>
               <a:t>, </a:t>
             </a:r>
             <a:r>
-              <a:rPr lang="en-US" altLang="en-US" sz="1996" dirty="0">
+              <a:rPr lang="en-US" altLang="en-US" dirty="0">
                 <a:latin typeface="Courier New" panose="02070309020205020404" pitchFamily="49" charset="0"/>
                 <a:cs typeface="Courier New" panose="02070309020205020404" pitchFamily="49" charset="0"/>
               </a:rPr>
               <a:t>.values(),.</a:t>
             </a:r>
             <a:r>
-              <a:rPr lang="en-US" altLang="en-US" sz="1996" dirty="0" err="1">
+              <a:rPr lang="en-US" altLang="en-US" dirty="0" err="1">
                 <a:latin typeface="Courier New" panose="02070309020205020404" pitchFamily="49" charset="0"/>
                 <a:cs typeface="Courier New" panose="02070309020205020404" pitchFamily="49" charset="0"/>
               </a:rPr>
               <a:t>setdefault</a:t>
             </a:r>
             <a:r>
-              <a:rPr lang="en-US" altLang="en-US" sz="1996" dirty="0">
+              <a:rPr lang="en-US" altLang="en-US" dirty="0">
                 <a:latin typeface="Courier New" panose="02070309020205020404" pitchFamily="49" charset="0"/>
                 <a:cs typeface="Courier New" panose="02070309020205020404" pitchFamily="49" charset="0"/>
               </a:rPr>
               <a:t>(&lt;key&gt;, &lt;default&gt;)</a:t>
             </a:r>
             <a:r>
-              <a:rPr lang="en-US" altLang="en-US" sz="1996" dirty="0">
+              <a:rPr lang="en-US" altLang="en-US" dirty="0">
                 <a:latin typeface="+mn-lt"/>
                 <a:cs typeface="Courier New" panose="02070309020205020404" pitchFamily="49" charset="0"/>
               </a:rPr>
               <a:t>, </a:t>
             </a:r>
             <a:r>
-              <a:rPr lang="en-US" altLang="en-US" sz="1996" dirty="0">
+              <a:rPr lang="en-US" altLang="en-US" dirty="0">
                 <a:latin typeface="Courier New" panose="02070309020205020404" pitchFamily="49" charset="0"/>
                 <a:cs typeface="Courier New" panose="02070309020205020404" pitchFamily="49" charset="0"/>
               </a:rPr>
@@ -33957,7 +33957,7 @@
         <p:spPr bwMode="auto">
           <a:xfrm>
             <a:off x="495360" y="345961"/>
-            <a:ext cx="8850500" cy="1204369"/>
+            <a:ext cx="7954422" cy="1175386"/>
           </a:xfrm>
           <a:prstGeom prst="rect">
             <a:avLst/>
@@ -34110,7 +34110,7 @@
               <a:buNone/>
             </a:pPr>
             <a:r>
-              <a:rPr lang="en-US" altLang="en-US" sz="2540">
+              <a:rPr lang="en-US" altLang="en-US" sz="2540" dirty="0">
                 <a:solidFill>
                   <a:schemeClr val="bg2"/>
                 </a:solidFill>
@@ -34132,7 +34132,7 @@
               <a:buNone/>
             </a:pPr>
             <a:r>
-              <a:rPr lang="en-US" altLang="en-US" sz="2540">
+              <a:rPr lang="en-US" altLang="en-US" sz="2400" dirty="0">
                 <a:solidFill>
                   <a:schemeClr val="bg2"/>
                 </a:solidFill>
@@ -34141,7 +34141,7 @@
               <a:t> </a:t>
             </a:r>
             <a:r>
-              <a:rPr lang="en-US" altLang="en-US" sz="1996">
+              <a:rPr lang="en-US" altLang="en-US" dirty="0">
                 <a:solidFill>
                   <a:schemeClr val="bg2"/>
                 </a:solidFill>
@@ -34151,7 +34151,7 @@
               <a:t>.keys()</a:t>
             </a:r>
             <a:r>
-              <a:rPr lang="en-US" altLang="en-US" sz="1996">
+              <a:rPr lang="en-US" altLang="en-US" dirty="0">
                 <a:solidFill>
                   <a:schemeClr val="bg2"/>
                 </a:solidFill>
@@ -34160,26 +34160,46 @@
               <a:t>, </a:t>
             </a:r>
             <a:r>
-              <a:rPr lang="en-US" altLang="en-US" sz="1996">
+              <a:rPr lang="en-US" altLang="en-US" dirty="0">
                 <a:solidFill>
                   <a:schemeClr val="bg2"/>
                 </a:solidFill>
                 <a:latin typeface="Courier New" panose="02070309020205020404" pitchFamily="49" charset="0"/>
                 <a:cs typeface="Courier New" panose="02070309020205020404" pitchFamily="49" charset="0"/>
               </a:rPr>
-              <a:t>.values(),.setdefault(&lt;key&gt;, &lt;default&gt;)</a:t>
-            </a:r>
-            <a:r>
-              <a:rPr lang="en-US" altLang="en-US" sz="1996">
+              <a:t>.values(),.</a:t>
+            </a:r>
+            <a:r>
+              <a:rPr lang="en-US" altLang="en-US" dirty="0" err="1">
                 <a:solidFill>
                   <a:schemeClr val="bg2"/>
                 </a:solidFill>
+                <a:latin typeface="Courier New" panose="02070309020205020404" pitchFamily="49" charset="0"/>
                 <a:cs typeface="Courier New" panose="02070309020205020404" pitchFamily="49" charset="0"/>
               </a:rPr>
+              <a:t>setdefault</a:t>
+            </a:r>
+            <a:r>
+              <a:rPr lang="en-US" altLang="en-US" dirty="0">
+                <a:solidFill>
+                  <a:schemeClr val="bg2"/>
+                </a:solidFill>
+                <a:latin typeface="Courier New" panose="02070309020205020404" pitchFamily="49" charset="0"/>
+                <a:cs typeface="Courier New" panose="02070309020205020404" pitchFamily="49" charset="0"/>
+              </a:rPr>
+              <a:t>(&lt;key&gt;, &lt;default&gt;)</a:t>
+            </a:r>
+            <a:r>
+              <a:rPr lang="en-US" altLang="en-US" dirty="0">
+                <a:solidFill>
+                  <a:schemeClr val="bg2"/>
+                </a:solidFill>
+                <a:cs typeface="Courier New" panose="02070309020205020404" pitchFamily="49" charset="0"/>
+              </a:rPr>
               <a:t>, </a:t>
             </a:r>
             <a:r>
-              <a:rPr lang="en-US" altLang="en-US" sz="1996">
+              <a:rPr lang="en-US" altLang="en-US" dirty="0">
                 <a:solidFill>
                   <a:schemeClr val="bg2"/>
                 </a:solidFill>
@@ -35173,7 +35193,7 @@
         <p:spPr bwMode="auto">
           <a:xfrm>
             <a:off x="495360" y="345961"/>
-            <a:ext cx="8850500" cy="1204369"/>
+            <a:ext cx="7954422" cy="1175386"/>
           </a:xfrm>
           <a:prstGeom prst="rect">
             <a:avLst/>
@@ -35326,7 +35346,7 @@
               <a:buNone/>
             </a:pPr>
             <a:r>
-              <a:rPr lang="en-US" altLang="en-US" sz="2540">
+              <a:rPr lang="en-US" altLang="en-US" sz="2540" dirty="0">
                 <a:solidFill>
                   <a:schemeClr val="bg2"/>
                 </a:solidFill>
@@ -35348,7 +35368,7 @@
               <a:buNone/>
             </a:pPr>
             <a:r>
-              <a:rPr lang="en-US" altLang="en-US" sz="2540">
+              <a:rPr lang="en-US" altLang="en-US" sz="2400" dirty="0">
                 <a:solidFill>
                   <a:schemeClr val="bg2"/>
                 </a:solidFill>
@@ -35357,7 +35377,7 @@
               <a:t> </a:t>
             </a:r>
             <a:r>
-              <a:rPr lang="en-US" altLang="en-US" sz="1996">
+              <a:rPr lang="en-US" altLang="en-US" dirty="0">
                 <a:solidFill>
                   <a:schemeClr val="bg2"/>
                 </a:solidFill>
@@ -35367,7 +35387,7 @@
               <a:t>.keys()</a:t>
             </a:r>
             <a:r>
-              <a:rPr lang="en-US" altLang="en-US" sz="1996">
+              <a:rPr lang="en-US" altLang="en-US" dirty="0">
                 <a:solidFill>
                   <a:schemeClr val="bg2"/>
                 </a:solidFill>
@@ -35376,26 +35396,46 @@
               <a:t>, </a:t>
             </a:r>
             <a:r>
-              <a:rPr lang="en-US" altLang="en-US" sz="1996">
+              <a:rPr lang="en-US" altLang="en-US" dirty="0">
                 <a:solidFill>
                   <a:schemeClr val="bg2"/>
                 </a:solidFill>
                 <a:latin typeface="Courier New" panose="02070309020205020404" pitchFamily="49" charset="0"/>
                 <a:cs typeface="Courier New" panose="02070309020205020404" pitchFamily="49" charset="0"/>
               </a:rPr>
-              <a:t>.values(),.setdefault(&lt;key&gt;, &lt;default&gt;)</a:t>
-            </a:r>
-            <a:r>
-              <a:rPr lang="en-US" altLang="en-US" sz="1996">
+              <a:t>.values(),.</a:t>
+            </a:r>
+            <a:r>
+              <a:rPr lang="en-US" altLang="en-US" dirty="0" err="1">
                 <a:solidFill>
                   <a:schemeClr val="bg2"/>
                 </a:solidFill>
+                <a:latin typeface="Courier New" panose="02070309020205020404" pitchFamily="49" charset="0"/>
                 <a:cs typeface="Courier New" panose="02070309020205020404" pitchFamily="49" charset="0"/>
               </a:rPr>
+              <a:t>setdefault</a:t>
+            </a:r>
+            <a:r>
+              <a:rPr lang="en-US" altLang="en-US" dirty="0">
+                <a:solidFill>
+                  <a:schemeClr val="bg2"/>
+                </a:solidFill>
+                <a:latin typeface="Courier New" panose="02070309020205020404" pitchFamily="49" charset="0"/>
+                <a:cs typeface="Courier New" panose="02070309020205020404" pitchFamily="49" charset="0"/>
+              </a:rPr>
+              <a:t>(&lt;key&gt;, &lt;default&gt;)</a:t>
+            </a:r>
+            <a:r>
+              <a:rPr lang="en-US" altLang="en-US" dirty="0">
+                <a:solidFill>
+                  <a:schemeClr val="bg2"/>
+                </a:solidFill>
+                <a:cs typeface="Courier New" panose="02070309020205020404" pitchFamily="49" charset="0"/>
+              </a:rPr>
               <a:t>, </a:t>
             </a:r>
             <a:r>
-              <a:rPr lang="en-US" altLang="en-US" sz="1996">
+              <a:rPr lang="en-US" altLang="en-US" dirty="0">
                 <a:solidFill>
                   <a:schemeClr val="bg2"/>
                 </a:solidFill>
@@ -36004,13 +36044,13 @@
               <a:buNone/>
             </a:pPr>
             <a:r>
-              <a:rPr lang="en-GB" altLang="en-US" sz="1814" b="1">
+              <a:rPr lang="en-GB" altLang="en-US" sz="1814" b="1" dirty="0">
                 <a:latin typeface="Courier New" panose="02070309020205020404" pitchFamily="49" charset="0"/>
               </a:rPr>
               <a:t>&gt;&gt;&gt;</a:t>
             </a:r>
             <a:r>
-              <a:rPr lang="en-GB" altLang="en-US" sz="1814">
+              <a:rPr lang="en-GB" altLang="en-US" sz="1814" dirty="0">
                 <a:latin typeface="Courier New" panose="02070309020205020404" pitchFamily="49" charset="0"/>
               </a:rPr>
               <a:t> heights = {"Everest": 8848, "K2": 8611}</a:t>
@@ -36029,16 +36069,28 @@
               <a:buNone/>
             </a:pPr>
             <a:r>
-              <a:rPr lang="en-GB" altLang="en-US" sz="1814" b="1">
+              <a:rPr lang="en-GB" altLang="en-US" sz="1814" b="1" dirty="0">
                 <a:latin typeface="Courier New" panose="02070309020205020404" pitchFamily="49" charset="0"/>
               </a:rPr>
               <a:t>&gt;&gt;&gt;</a:t>
             </a:r>
             <a:r>
-              <a:rPr lang="en-GB" altLang="en-US" sz="1814">
+              <a:rPr lang="en-GB" altLang="en-US" sz="1814" dirty="0">
                 <a:latin typeface="Courier New" panose="02070309020205020404" pitchFamily="49" charset="0"/>
               </a:rPr>
-              <a:t> heights.items()</a:t>
+              <a:t> </a:t>
+            </a:r>
+            <a:r>
+              <a:rPr lang="en-GB" altLang="en-US" sz="1814" dirty="0" err="1">
+                <a:latin typeface="Courier New" panose="02070309020205020404" pitchFamily="49" charset="0"/>
+              </a:rPr>
+              <a:t>heights.items</a:t>
+            </a:r>
+            <a:r>
+              <a:rPr lang="en-GB" altLang="en-US" sz="1814" dirty="0">
+                <a:latin typeface="Courier New" panose="02070309020205020404" pitchFamily="49" charset="0"/>
+              </a:rPr>
+              <a:t>()</a:t>
             </a:r>
           </a:p>
           <a:p>
@@ -36054,13 +36106,22 @@
               <a:buNone/>
             </a:pPr>
             <a:r>
-              <a:rPr lang="en-US" altLang="en-US" sz="1814" i="1">
+              <a:rPr lang="en-US" altLang="en-US" sz="1814" i="1" dirty="0" err="1">
                 <a:solidFill>
                   <a:srgbClr val="006600"/>
                 </a:solidFill>
                 <a:latin typeface="Courier New" panose="02070309020205020404" pitchFamily="49" charset="0"/>
               </a:rPr>
-              <a:t>dict_items([('Everest', 8848), ('K2', 8611)])</a:t>
+              <a:t>dict_items</a:t>
+            </a:r>
+            <a:r>
+              <a:rPr lang="en-US" altLang="en-US" sz="1814" i="1" dirty="0">
+                <a:solidFill>
+                  <a:srgbClr val="006600"/>
+                </a:solidFill>
+                <a:latin typeface="Courier New" panose="02070309020205020404" pitchFamily="49" charset="0"/>
+              </a:rPr>
+              <a:t>([('Everest', 8848), ('K2', 8611)])</a:t>
             </a:r>
           </a:p>
           <a:p>
@@ -36075,7 +36136,7 @@
               <a:buFont typeface="Times New Roman" panose="02020603050405020304" pitchFamily="18" charset="0"/>
               <a:buNone/>
             </a:pPr>
-            <a:endParaRPr lang="en-GB" altLang="en-US" sz="1814">
+            <a:endParaRPr lang="en-GB" altLang="en-US" sz="1814" dirty="0">
               <a:latin typeface="Courier New" panose="02070309020205020404" pitchFamily="49" charset="0"/>
             </a:endParaRPr>
           </a:p>
@@ -36092,40 +36153,52 @@
               <a:buNone/>
             </a:pPr>
             <a:r>
-              <a:rPr lang="en-GB" altLang="en-US" sz="1814" b="1">
+              <a:rPr lang="en-GB" altLang="en-US" sz="1814" b="1" dirty="0">
                 <a:latin typeface="Courier New" panose="02070309020205020404" pitchFamily="49" charset="0"/>
               </a:rPr>
               <a:t>&gt;&gt;&gt;</a:t>
             </a:r>
             <a:r>
-              <a:rPr lang="en-GB" altLang="en-US" sz="1814">
+              <a:rPr lang="en-GB" altLang="en-US" sz="1814" dirty="0">
                 <a:latin typeface="Courier New" panose="02070309020205020404" pitchFamily="49" charset="0"/>
               </a:rPr>
               <a:t> </a:t>
             </a:r>
             <a:r>
-              <a:rPr lang="en-GB" altLang="en-US" sz="1814" b="1">
+              <a:rPr lang="en-GB" altLang="en-US" sz="1814" b="1" dirty="0">
                 <a:latin typeface="Courier New" panose="02070309020205020404" pitchFamily="49" charset="0"/>
               </a:rPr>
               <a:t>for</a:t>
             </a:r>
             <a:r>
-              <a:rPr lang="en-GB" altLang="en-US" sz="1814">
+              <a:rPr lang="en-GB" altLang="en-US" sz="1814" dirty="0">
                 <a:latin typeface="Courier New" panose="02070309020205020404" pitchFamily="49" charset="0"/>
               </a:rPr>
               <a:t> (mountain, height) </a:t>
             </a:r>
             <a:r>
-              <a:rPr lang="en-GB" altLang="en-US" sz="1814" b="1">
+              <a:rPr lang="en-GB" altLang="en-US" sz="1814" b="1" dirty="0">
                 <a:latin typeface="Courier New" panose="02070309020205020404" pitchFamily="49" charset="0"/>
               </a:rPr>
               <a:t>in</a:t>
             </a:r>
             <a:r>
-              <a:rPr lang="en-GB" altLang="en-US" sz="1814">
+              <a:rPr lang="en-GB" altLang="en-US" sz="1814" dirty="0">
                 <a:latin typeface="Courier New" panose="02070309020205020404" pitchFamily="49" charset="0"/>
               </a:rPr>
-              <a:t> heights.items():</a:t>
+              <a:t> </a:t>
+            </a:r>
+            <a:r>
+              <a:rPr lang="en-GB" altLang="en-US" sz="1814" dirty="0" err="1">
+                <a:latin typeface="Courier New" panose="02070309020205020404" pitchFamily="49" charset="0"/>
+              </a:rPr>
+              <a:t>heights.items</a:t>
+            </a:r>
+            <a:r>
+              <a:rPr lang="en-GB" altLang="en-US" sz="1814" dirty="0">
+                <a:latin typeface="Courier New" panose="02070309020205020404" pitchFamily="49" charset="0"/>
+              </a:rPr>
+              <a:t>():</a:t>
             </a:r>
           </a:p>
           <a:p>
@@ -36141,22 +36214,22 @@
               <a:buNone/>
             </a:pPr>
             <a:r>
-              <a:rPr lang="en-GB" altLang="en-US" sz="1814">
+              <a:rPr lang="en-GB" altLang="en-US" sz="1814" dirty="0">
                 <a:latin typeface="Courier New" panose="02070309020205020404" pitchFamily="49" charset="0"/>
               </a:rPr>
               <a:t>        </a:t>
             </a:r>
             <a:r>
-              <a:rPr lang="en-GB" altLang="en-US" sz="1814" b="1">
+              <a:rPr lang="en-GB" altLang="en-US" sz="1814" b="1" dirty="0">
                 <a:latin typeface="Courier New" panose="02070309020205020404" pitchFamily="49" charset="0"/>
               </a:rPr>
               <a:t>print</a:t>
             </a:r>
             <a:r>
-              <a:rPr lang="en-GB" altLang="en-US" sz="1814">
+              <a:rPr lang="en-GB" altLang="en-US" sz="1814" dirty="0">
                 <a:latin typeface="Courier New" panose="02070309020205020404" pitchFamily="49" charset="0"/>
               </a:rPr>
-              <a:t>("{0} is {1}m high".format(mountain, height))</a:t>
+              <a:t>(f"{mountain} is {height}m high")</a:t>
             </a:r>
           </a:p>
           <a:p>
@@ -36171,7 +36244,7 @@
               <a:buFont typeface="Times New Roman" panose="02020603050405020304" pitchFamily="18" charset="0"/>
               <a:buNone/>
             </a:pPr>
-            <a:endParaRPr lang="en-GB" altLang="en-US" sz="1814">
+            <a:endParaRPr lang="en-GB" altLang="en-US" sz="1814" dirty="0">
               <a:latin typeface="Courier New" panose="02070309020205020404" pitchFamily="49" charset="0"/>
             </a:endParaRPr>
           </a:p>
@@ -36188,7 +36261,7 @@
               <a:buNone/>
             </a:pPr>
             <a:r>
-              <a:rPr lang="en-GB" altLang="en-US" sz="1814" i="1">
+              <a:rPr lang="en-GB" altLang="en-US" sz="1814" i="1" dirty="0">
                 <a:solidFill>
                   <a:srgbClr val="006600"/>
                 </a:solidFill>
@@ -36210,7 +36283,7 @@
               <a:buNone/>
             </a:pPr>
             <a:r>
-              <a:rPr lang="en-GB" altLang="en-US" sz="1814" i="1">
+              <a:rPr lang="en-GB" altLang="en-US" sz="1814" i="1" dirty="0">
                 <a:solidFill>
                   <a:srgbClr val="006600"/>
                 </a:solidFill>
@@ -36231,7 +36304,7 @@
               <a:buFont typeface="Times New Roman" panose="02020603050405020304" pitchFamily="18" charset="0"/>
               <a:buNone/>
             </a:pPr>
-            <a:endParaRPr lang="en-US" altLang="en-US" sz="1814" i="1">
+            <a:endParaRPr lang="en-US" altLang="en-US" sz="1814" i="1" dirty="0">
               <a:solidFill>
                 <a:srgbClr val="000066"/>
               </a:solidFill>
@@ -36251,7 +36324,7 @@
         <p:spPr bwMode="auto">
           <a:xfrm>
             <a:off x="495361" y="345961"/>
-            <a:ext cx="7882286" cy="1802416"/>
+            <a:ext cx="6340197" cy="1688154"/>
           </a:xfrm>
           <a:prstGeom prst="rect">
             <a:avLst/>
@@ -36491,21 +36564,21 @@
               <a:t>	</a:t>
             </a:r>
             <a:r>
-              <a:rPr lang="en-US" altLang="en-US" sz="2540" dirty="0">
+              <a:rPr lang="en-US" altLang="en-US" sz="2400" dirty="0">
                 <a:latin typeface="Courier New" panose="02070309020205020404" pitchFamily="49" charset="0"/>
                 <a:cs typeface="Courier New" panose="02070309020205020404" pitchFamily="49" charset="0"/>
               </a:rPr>
               <a:t>.items()</a:t>
             </a:r>
             <a:r>
-              <a:rPr lang="en-US" altLang="en-US" sz="2540" dirty="0">
+              <a:rPr lang="en-US" altLang="en-US" sz="2400" dirty="0">
                 <a:latin typeface="+mn-lt"/>
                 <a:cs typeface="Courier New" panose="02070309020205020404" pitchFamily="49" charset="0"/>
               </a:rPr>
               <a:t> </a:t>
             </a:r>
             <a:r>
-              <a:rPr lang="en-US" altLang="en-US" sz="2540" dirty="0">
+              <a:rPr lang="en-US" altLang="en-US" sz="2400" dirty="0">
                 <a:latin typeface="Calibri" panose="020F0502020204030204" pitchFamily="34" charset="0"/>
               </a:rPr>
               <a:t>returns a sequence of tuples: </a:t>
@@ -36519,13 +36592,13 @@
               <a:defRPr/>
             </a:pPr>
             <a:r>
-              <a:rPr lang="en-US" altLang="en-US" sz="2540" dirty="0">
+              <a:rPr lang="en-US" altLang="en-US" sz="2000" dirty="0">
                 <a:latin typeface="Calibri" panose="020F0502020204030204" pitchFamily="34" charset="0"/>
               </a:rPr>
               <a:t>	</a:t>
             </a:r>
             <a:r>
-              <a:rPr lang="en-US" altLang="en-US" sz="2540" dirty="0">
+              <a:rPr lang="en-US" altLang="en-US" sz="2000" dirty="0">
                 <a:latin typeface="Courier New" panose="02070309020205020404" pitchFamily="49" charset="0"/>
                 <a:cs typeface="Courier New" panose="02070309020205020404" pitchFamily="49" charset="0"/>
               </a:rPr>

</xml_diff>